<commit_message>
end of week dump, work on poster over weekend
</commit_message>
<xml_diff>
--- a/Cataract_posterslidesonly.pptx
+++ b/Cataract_posterslidesonly.pptx
@@ -702,12 +702,14 @@
           <a:p>
             <a:r>
               <a:rPr lang="en-US" dirty="0" smtClean="0"/>
-              <a:t>Shock</a:t>
+              <a:t>Program</a:t>
             </a:r>
             <a:r>
               <a:rPr lang="en-US" baseline="0" dirty="0" smtClean="0"/>
-              <a:t> and awe</a:t>
-            </a:r>
+              <a:t> names</a:t>
+            </a:r>
+          </a:p>
+          <a:p>
             <a:endParaRPr lang="en-US" dirty="0"/>
           </a:p>
         </p:txBody>
@@ -729,7 +731,7 @@
           <a:p>
             <a:fld id="{DEA2FB39-1398-40D8-9A7E-B2F7B9CEAD5C}" type="slidenum">
               <a:rPr lang="en-US" smtClean="0"/>
-              <a:t>7</a:t>
+              <a:t>2</a:t>
             </a:fld>
             <a:endParaRPr lang="en-US"/>
           </a:p>
@@ -738,7 +740,7 @@
     </p:spTree>
     <p:extLst>
       <p:ext uri="{BB962C8B-B14F-4D97-AF65-F5344CB8AC3E}">
-        <p14:creationId xmlns:p14="http://schemas.microsoft.com/office/powerpoint/2010/main" val="1125618355"/>
+        <p14:creationId xmlns:p14="http://schemas.microsoft.com/office/powerpoint/2010/main" val="1346696553"/>
       </p:ext>
     </p:extLst>
   </p:cSld>
@@ -792,6 +794,14 @@
           <a:bodyPr/>
           <a:lstStyle/>
           <a:p>
+            <a:r>
+              <a:rPr lang="en-US" dirty="0" smtClean="0"/>
+              <a:t>Shock</a:t>
+            </a:r>
+            <a:r>
+              <a:rPr lang="en-US" baseline="0" dirty="0" smtClean="0"/>
+              <a:t> and awe</a:t>
+            </a:r>
             <a:endParaRPr lang="en-US" dirty="0"/>
           </a:p>
         </p:txBody>
@@ -803,7 +813,7 @@
             <a:spLocks noGrp="1"/>
           </p:cNvSpPr>
           <p:nvPr>
-            <p:ph type="sldNum" sz="quarter" idx="5"/>
+            <p:ph type="sldNum" sz="quarter" idx="10"/>
           </p:nvPr>
         </p:nvSpPr>
         <p:spPr/>
@@ -813,7 +823,7 @@
           <a:p>
             <a:fld id="{DEA2FB39-1398-40D8-9A7E-B2F7B9CEAD5C}" type="slidenum">
               <a:rPr lang="en-US" smtClean="0"/>
-              <a:t>8</a:t>
+              <a:t>7</a:t>
             </a:fld>
             <a:endParaRPr lang="en-US"/>
           </a:p>
@@ -822,7 +832,7 @@
     </p:spTree>
     <p:extLst>
       <p:ext uri="{BB962C8B-B14F-4D97-AF65-F5344CB8AC3E}">
-        <p14:creationId xmlns:p14="http://schemas.microsoft.com/office/powerpoint/2010/main" val="1556748383"/>
+        <p14:creationId xmlns:p14="http://schemas.microsoft.com/office/powerpoint/2010/main" val="1125618355"/>
       </p:ext>
     </p:extLst>
   </p:cSld>
@@ -876,10 +886,7 @@
           <a:bodyPr/>
           <a:lstStyle/>
           <a:p>
-            <a:r>
-              <a:rPr lang="en-US" dirty="0"/>
-              <a:t>Organ development; overall, developmental functions</a:t>
-            </a:r>
+            <a:endParaRPr lang="en-US" dirty="0"/>
           </a:p>
         </p:txBody>
       </p:sp>
@@ -900,7 +907,7 @@
           <a:p>
             <a:fld id="{DEA2FB39-1398-40D8-9A7E-B2F7B9CEAD5C}" type="slidenum">
               <a:rPr lang="en-US" smtClean="0"/>
-              <a:t>12</a:t>
+              <a:t>8</a:t>
             </a:fld>
             <a:endParaRPr lang="en-US"/>
           </a:p>
@@ -909,7 +916,7 @@
     </p:spTree>
     <p:extLst>
       <p:ext uri="{BB962C8B-B14F-4D97-AF65-F5344CB8AC3E}">
-        <p14:creationId xmlns:p14="http://schemas.microsoft.com/office/powerpoint/2010/main" val="1808944046"/>
+        <p14:creationId xmlns:p14="http://schemas.microsoft.com/office/powerpoint/2010/main" val="1556748383"/>
       </p:ext>
     </p:extLst>
   </p:cSld>
@@ -963,7 +970,10 @@
           <a:bodyPr/>
           <a:lstStyle/>
           <a:p>
-            <a:endParaRPr lang="en-US" dirty="0"/>
+            <a:r>
+              <a:rPr lang="en-US" dirty="0"/>
+              <a:t>Organ development; overall, developmental functions</a:t>
+            </a:r>
           </a:p>
         </p:txBody>
       </p:sp>
@@ -984,7 +994,7 @@
           <a:p>
             <a:fld id="{DEA2FB39-1398-40D8-9A7E-B2F7B9CEAD5C}" type="slidenum">
               <a:rPr lang="en-US" smtClean="0"/>
-              <a:t>13</a:t>
+              <a:t>12</a:t>
             </a:fld>
             <a:endParaRPr lang="en-US"/>
           </a:p>
@@ -993,7 +1003,7 @@
     </p:spTree>
     <p:extLst>
       <p:ext uri="{BB962C8B-B14F-4D97-AF65-F5344CB8AC3E}">
-        <p14:creationId xmlns:p14="http://schemas.microsoft.com/office/powerpoint/2010/main" val="4034479550"/>
+        <p14:creationId xmlns:p14="http://schemas.microsoft.com/office/powerpoint/2010/main" val="1808944046"/>
       </p:ext>
     </p:extLst>
   </p:cSld>
@@ -1047,10 +1057,7 @@
           <a:bodyPr/>
           <a:lstStyle/>
           <a:p>
-            <a:r>
-              <a:rPr lang="en-US" dirty="0"/>
-              <a:t>Fructose = sugar = related; emphasize more and downplay the fact that there’s only three (two) genes</a:t>
-            </a:r>
+            <a:endParaRPr lang="en-US" dirty="0"/>
           </a:p>
         </p:txBody>
       </p:sp>
@@ -1071,7 +1078,7 @@
           <a:p>
             <a:fld id="{DEA2FB39-1398-40D8-9A7E-B2F7B9CEAD5C}" type="slidenum">
               <a:rPr lang="en-US" smtClean="0"/>
-              <a:t>15</a:t>
+              <a:t>13</a:t>
             </a:fld>
             <a:endParaRPr lang="en-US"/>
           </a:p>
@@ -1080,7 +1087,7 @@
     </p:spTree>
     <p:extLst>
       <p:ext uri="{BB962C8B-B14F-4D97-AF65-F5344CB8AC3E}">
-        <p14:creationId xmlns:p14="http://schemas.microsoft.com/office/powerpoint/2010/main" val="2811266589"/>
+        <p14:creationId xmlns:p14="http://schemas.microsoft.com/office/powerpoint/2010/main" val="4034479550"/>
       </p:ext>
     </p:extLst>
   </p:cSld>
@@ -1135,9 +1142,127 @@
           <a:lstStyle/>
           <a:p>
             <a:r>
-              <a:rPr lang="en-US" dirty="0"/>
-              <a:t>Label ._.</a:t>
-            </a:r>
+              <a:rPr lang="en-US" dirty="0" smtClean="0"/>
+              <a:t>Fructose/glucose </a:t>
+            </a:r>
+            <a:r>
+              <a:rPr lang="en-US" dirty="0" err="1" smtClean="0"/>
+              <a:t>interation</a:t>
+            </a:r>
+            <a:r>
+              <a:rPr lang="en-US" dirty="0" smtClean="0"/>
+              <a:t> pathway,</a:t>
+            </a:r>
+            <a:r>
+              <a:rPr lang="en-US" baseline="0" dirty="0" smtClean="0"/>
+              <a:t> diabetic patients (molecules/equation)</a:t>
+            </a:r>
+          </a:p>
+          <a:p>
+            <a:r>
+              <a:rPr lang="en-US" baseline="0" dirty="0" smtClean="0"/>
+              <a:t>“Polyol pathway”</a:t>
+            </a:r>
+            <a:endParaRPr lang="en-US" dirty="0"/>
+          </a:p>
+        </p:txBody>
+      </p:sp>
+      <p:sp>
+        <p:nvSpPr>
+          <p:cNvPr id="4" name="Slide Number Placeholder 3"/>
+          <p:cNvSpPr>
+            <a:spLocks noGrp="1"/>
+          </p:cNvSpPr>
+          <p:nvPr>
+            <p:ph type="sldNum" sz="quarter" idx="5"/>
+          </p:nvPr>
+        </p:nvSpPr>
+        <p:spPr/>
+        <p:txBody>
+          <a:bodyPr/>
+          <a:lstStyle/>
+          <a:p>
+            <a:fld id="{DEA2FB39-1398-40D8-9A7E-B2F7B9CEAD5C}" type="slidenum">
+              <a:rPr lang="en-US" smtClean="0"/>
+              <a:t>15</a:t>
+            </a:fld>
+            <a:endParaRPr lang="en-US"/>
+          </a:p>
+        </p:txBody>
+      </p:sp>
+    </p:spTree>
+    <p:extLst>
+      <p:ext uri="{BB962C8B-B14F-4D97-AF65-F5344CB8AC3E}">
+        <p14:creationId xmlns:p14="http://schemas.microsoft.com/office/powerpoint/2010/main" val="2811266589"/>
+      </p:ext>
+    </p:extLst>
+  </p:cSld>
+  <p:clrMapOvr>
+    <a:masterClrMapping/>
+  </p:clrMapOvr>
+</p:notes>
+</file>
+
+<file path=ppt/notesSlides/notesSlide8.xml><?xml version="1.0" encoding="utf-8"?>
+<p:notes xmlns:a="http://schemas.openxmlformats.org/drawingml/2006/main" xmlns:r="http://schemas.openxmlformats.org/officeDocument/2006/relationships" xmlns:p="http://schemas.openxmlformats.org/presentationml/2006/main">
+  <p:cSld>
+    <p:spTree>
+      <p:nvGrpSpPr>
+        <p:cNvPr id="1" name=""/>
+        <p:cNvGrpSpPr/>
+        <p:nvPr/>
+      </p:nvGrpSpPr>
+      <p:grpSpPr>
+        <a:xfrm>
+          <a:off x="0" y="0"/>
+          <a:ext cx="0" cy="0"/>
+          <a:chOff x="0" y="0"/>
+          <a:chExt cx="0" cy="0"/>
+        </a:xfrm>
+      </p:grpSpPr>
+      <p:sp>
+        <p:nvSpPr>
+          <p:cNvPr id="2" name="Slide Image Placeholder 1"/>
+          <p:cNvSpPr>
+            <a:spLocks noGrp="1" noRot="1" noChangeAspect="1"/>
+          </p:cNvSpPr>
+          <p:nvPr>
+            <p:ph type="sldImg"/>
+          </p:nvPr>
+        </p:nvSpPr>
+        <p:spPr/>
+      </p:sp>
+      <p:sp>
+        <p:nvSpPr>
+          <p:cNvPr id="3" name="Notes Placeholder 2"/>
+          <p:cNvSpPr>
+            <a:spLocks noGrp="1"/>
+          </p:cNvSpPr>
+          <p:nvPr>
+            <p:ph type="body" idx="1"/>
+          </p:nvPr>
+        </p:nvSpPr>
+        <p:spPr/>
+        <p:txBody>
+          <a:bodyPr/>
+          <a:lstStyle/>
+          <a:p>
+            <a:r>
+              <a:rPr lang="en-US" dirty="0" smtClean="0"/>
+              <a:t>Add</a:t>
+            </a:r>
+            <a:r>
+              <a:rPr lang="en-US" baseline="0" dirty="0" smtClean="0"/>
+              <a:t> a legend</a:t>
+            </a:r>
+            <a:endParaRPr lang="en-US" dirty="0" smtClean="0"/>
+          </a:p>
+          <a:p>
+            <a:r>
+              <a:rPr lang="en-US" dirty="0" smtClean="0"/>
+              <a:t>Name of diagrams? -&gt;heat map</a:t>
+            </a:r>
+            <a:endParaRPr lang="en-US" dirty="0"/>
           </a:p>
         </p:txBody>
       </p:sp>
@@ -5567,7 +5692,11 @@
             </a:pPr>
             <a:r>
               <a:rPr lang="en" sz="4800" dirty="0" smtClean="0"/>
-              <a:t>Discovery of Two Genetic Functions Related to Cataractogenesis</a:t>
+              <a:t>Gene Netwoks Related </a:t>
+            </a:r>
+            <a:r>
+              <a:rPr lang="en" sz="4800" dirty="0" smtClean="0"/>
+              <a:t>to Cataractogenesis</a:t>
             </a:r>
             <a:endParaRPr sz="4800" dirty="0"/>
           </a:p>
@@ -5670,7 +5799,9 @@
         </p:nvSpPr>
         <p:spPr/>
         <p:txBody>
-          <a:bodyPr/>
+          <a:bodyPr>
+            <a:normAutofit lnSpcReduction="10000"/>
+          </a:bodyPr>
           <a:lstStyle/>
           <a:p>
             <a:endParaRPr lang="en-US" dirty="0"/>
@@ -5695,8 +5826,12 @@
           </a:p>
           <a:p>
             <a:r>
-              <a:rPr lang="en-US" dirty="0"/>
-              <a:t>This network shows many functions related to keratinization (insertion of keratin into skin/hair cells).</a:t>
+              <a:rPr lang="en-US" dirty="0" smtClean="0"/>
+              <a:t>Network 2, based on cluster 7, shows </a:t>
+            </a:r>
+            <a:r>
+              <a:rPr lang="en-US" dirty="0"/>
+              <a:t>many functions related to keratinization (insertion of keratin into skin/hair cells).</a:t>
             </a:r>
           </a:p>
           <a:p>
@@ -5999,7 +6134,15 @@
           <a:p>
             <a:r>
               <a:rPr lang="en-US" dirty="0" smtClean="0"/>
-              <a:t>This network is related with organ development.</a:t>
+              <a:t>Network 2 (based on cluster 8)</a:t>
+            </a:r>
+            <a:r>
+              <a:rPr lang="en-US" dirty="0" smtClean="0"/>
+              <a:t> is </a:t>
+            </a:r>
+            <a:r>
+              <a:rPr lang="en-US" dirty="0" smtClean="0"/>
+              <a:t>related with organ development.</a:t>
             </a:r>
             <a:endParaRPr lang="en-US" dirty="0"/>
           </a:p>
@@ -6120,9 +6263,16 @@
             <p:ph type="body" sz="half" idx="2"/>
           </p:nvPr>
         </p:nvSpPr>
-        <p:spPr/>
-        <p:txBody>
-          <a:bodyPr/>
+        <p:spPr>
+          <a:xfrm>
+            <a:off x="457200" y="1234815"/>
+            <a:ext cx="3200400" cy="5375535"/>
+          </a:xfrm>
+        </p:spPr>
+        <p:txBody>
+          <a:bodyPr>
+            <a:normAutofit/>
+          </a:bodyPr>
           <a:lstStyle/>
           <a:p>
             <a:endParaRPr lang="en-US" dirty="0"/>
@@ -6147,8 +6297,12 @@
           </a:p>
           <a:p>
             <a:r>
-              <a:rPr lang="en-US" dirty="0"/>
-              <a:t>A network related to metabolism, especially of sugars, fats, and amino acids. Fatty acids affect the expression of lutein, which is shown to prevent cataract formation (</a:t>
+              <a:rPr lang="en-US" dirty="0" smtClean="0"/>
+              <a:t>Network 1 based on cluster 20 is </a:t>
+            </a:r>
+            <a:r>
+              <a:rPr lang="en-US" dirty="0"/>
+              <a:t>related to metabolism, especially of sugars, fats, and amino acids. Fatty acids affect the expression of lutein, which is shown to prevent cataract formation (</a:t>
             </a:r>
             <a:r>
               <a:rPr lang="en-US" dirty="0" err="1"/>
@@ -6327,8 +6481,12 @@
           </a:p>
           <a:p>
             <a:r>
-              <a:rPr lang="en-US" dirty="0"/>
-              <a:t>This network is heavily centered around the TNF (tumor necrosis factor) gene, which has many functions varying from tissue regeneration to apoptosis (</a:t>
+              <a:rPr lang="en-US" dirty="0" smtClean="0"/>
+              <a:t>Network 1, based on cluster 21, is </a:t>
+            </a:r>
+            <a:r>
+              <a:rPr lang="en-US" dirty="0"/>
+              <a:t>heavily centered around the TNF (tumor necrosis factor) gene, which has many functions varying from tissue regeneration to apoptosis (</a:t>
             </a:r>
             <a:r>
               <a:rPr lang="en-US" dirty="0" err="1"/>
@@ -6486,7 +6644,7 @@
         <p:spPr>
           <a:xfrm>
             <a:off x="6409592" y="1872762"/>
-            <a:ext cx="3912577" cy="1477328"/>
+            <a:ext cx="3912577" cy="2585323"/>
           </a:xfrm>
           <a:prstGeom prst="rect">
             <a:avLst/>
@@ -6501,9 +6659,76 @@
           <a:p>
             <a:r>
               <a:rPr lang="en-US" dirty="0" smtClean="0"/>
-              <a:t>It has been shown that within non-diabetic patients, fructose levels are higher in those with senile cataract than those without (Gul et al, 2009). This pathway further confirms the finding.</a:t>
-            </a:r>
-            <a:endParaRPr lang="en-US" dirty="0"/>
+              <a:t>It has been shown that within non-diabetic patients, fructose levels are higher in those with senile cataract than those without (Gul et al, 2009). </a:t>
+            </a:r>
+            <a:endParaRPr lang="en-US" dirty="0" smtClean="0"/>
+          </a:p>
+          <a:p>
+            <a:r>
+              <a:rPr lang="en-US" dirty="0" smtClean="0"/>
+              <a:t>Fructose plays a large factor in diabetic cataract. The polyol pathway, which converts glucose to fructose, relies on oxidation to convert the intermediate sorbitol to fructose:</a:t>
+            </a:r>
+            <a:endParaRPr lang="en-US" dirty="0" smtClean="0"/>
+          </a:p>
+        </p:txBody>
+      </p:sp>
+      <p:pic>
+        <p:nvPicPr>
+          <p:cNvPr id="7" name="Picture 6"/>
+          <p:cNvPicPr>
+            <a:picLocks noChangeAspect="1"/>
+          </p:cNvPicPr>
+          <p:nvPr/>
+        </p:nvPicPr>
+        <p:blipFill>
+          <a:blip r:embed="rId4" cstate="print">
+            <a:extLst>
+              <a:ext uri="{28A0092B-C50C-407E-A947-70E740481C1C}">
+                <a14:useLocalDpi xmlns:a14="http://schemas.microsoft.com/office/drawing/2010/main" val="0"/>
+              </a:ext>
+            </a:extLst>
+          </a:blip>
+          <a:stretch>
+            <a:fillRect/>
+          </a:stretch>
+        </p:blipFill>
+        <p:spPr>
+          <a:xfrm>
+            <a:off x="6656633" y="4458085"/>
+            <a:ext cx="3793911" cy="1342640"/>
+          </a:xfrm>
+          <a:prstGeom prst="rect">
+            <a:avLst/>
+          </a:prstGeom>
+        </p:spPr>
+      </p:pic>
+      <p:sp>
+        <p:nvSpPr>
+          <p:cNvPr id="8" name="TextBox 7"/>
+          <p:cNvSpPr txBox="1"/>
+          <p:nvPr/>
+        </p:nvSpPr>
+        <p:spPr>
+          <a:xfrm>
+            <a:off x="6409592" y="5750746"/>
+            <a:ext cx="4040952" cy="646331"/>
+          </a:xfrm>
+          <a:prstGeom prst="rect">
+            <a:avLst/>
+          </a:prstGeom>
+          <a:noFill/>
+        </p:spPr>
+        <p:txBody>
+          <a:bodyPr wrap="square" rtlCol="0">
+            <a:spAutoFit/>
+          </a:bodyPr>
+          <a:lstStyle/>
+          <a:p>
+            <a:r>
+              <a:rPr lang="en-US" dirty="0" smtClean="0"/>
+              <a:t>This pathway places a large oxidative stress on the eye (Lee and Chung, 1999).</a:t>
+            </a:r>
+            <a:endParaRPr lang="en-US" dirty="0" smtClean="0"/>
           </a:p>
         </p:txBody>
       </p:sp>
@@ -6537,16 +6762,992 @@
           <a:chExt cx="0" cy="0"/>
         </a:xfrm>
       </p:grpSpPr>
+      <p:sp>
+        <p:nvSpPr>
+          <p:cNvPr id="14" name="TextBox 13"/>
+          <p:cNvSpPr txBox="1"/>
+          <p:nvPr/>
+        </p:nvSpPr>
+        <p:spPr>
+          <a:xfrm>
+            <a:off x="110833" y="2467652"/>
+            <a:ext cx="6178109" cy="461665"/>
+          </a:xfrm>
+          <a:prstGeom prst="rect">
+            <a:avLst/>
+          </a:prstGeom>
+          <a:noFill/>
+        </p:spPr>
+        <p:txBody>
+          <a:bodyPr wrap="square" rtlCol="0">
+            <a:spAutoFit/>
+          </a:bodyPr>
+          <a:lstStyle/>
+          <a:p>
+            <a:r>
+              <a:rPr lang="en-US" sz="1200" dirty="0" smtClean="0"/>
+              <a:t>Cluster 7 disease/function maps. Small maps represent “ophthalmic disease” and “organismal injury and abnormalities”, respectively</a:t>
+            </a:r>
+            <a:endParaRPr lang="en-US" sz="1200" dirty="0"/>
+          </a:p>
+        </p:txBody>
+      </p:sp>
+      <p:sp>
+        <p:nvSpPr>
+          <p:cNvPr id="15" name="TextBox 14"/>
+          <p:cNvSpPr txBox="1"/>
+          <p:nvPr/>
+        </p:nvSpPr>
+        <p:spPr>
+          <a:xfrm>
+            <a:off x="1599" y="5551977"/>
+            <a:ext cx="6178109" cy="646331"/>
+          </a:xfrm>
+          <a:prstGeom prst="rect">
+            <a:avLst/>
+          </a:prstGeom>
+          <a:noFill/>
+        </p:spPr>
+        <p:txBody>
+          <a:bodyPr wrap="square" rtlCol="0">
+            <a:spAutoFit/>
+          </a:bodyPr>
+          <a:lstStyle/>
+          <a:p>
+            <a:r>
+              <a:rPr lang="en-US" sz="1200" dirty="0" smtClean="0"/>
+              <a:t>Cluster 20 disease/function map. Small map represents “small molecule biochemistry</a:t>
+            </a:r>
+            <a:r>
+              <a:rPr lang="en-US" sz="1200" dirty="0" smtClean="0"/>
+              <a:t>” and “organismal injury and abnormalities”, respectively, </a:t>
+            </a:r>
+            <a:r>
+              <a:rPr lang="en-US" sz="1200" dirty="0" smtClean="0"/>
+              <a:t>and the significant square </a:t>
+            </a:r>
+            <a:r>
+              <a:rPr lang="en-US" sz="1200" dirty="0" smtClean="0"/>
+              <a:t>in SMB represents </a:t>
+            </a:r>
+            <a:r>
+              <a:rPr lang="en-US" sz="1200" dirty="0" smtClean="0"/>
+              <a:t>“Metabolism of D-galactose”.</a:t>
+            </a:r>
+            <a:endParaRPr lang="en-US" sz="1200" dirty="0"/>
+          </a:p>
+        </p:txBody>
+      </p:sp>
+      <p:sp>
+        <p:nvSpPr>
+          <p:cNvPr id="16" name="TextBox 15"/>
+          <p:cNvSpPr txBox="1"/>
+          <p:nvPr/>
+        </p:nvSpPr>
+        <p:spPr>
+          <a:xfrm>
+            <a:off x="6375685" y="2471281"/>
+            <a:ext cx="5743757" cy="461665"/>
+          </a:xfrm>
+          <a:prstGeom prst="rect">
+            <a:avLst/>
+          </a:prstGeom>
+          <a:noFill/>
+        </p:spPr>
+        <p:txBody>
+          <a:bodyPr wrap="square" rtlCol="0">
+            <a:spAutoFit/>
+          </a:bodyPr>
+          <a:lstStyle/>
+          <a:p>
+            <a:r>
+              <a:rPr lang="en-US" sz="1200" dirty="0" smtClean="0"/>
+              <a:t>Cluster 8 disease/function maps. Small maps represent “ophthalmic disease” and “organismal injury and abnormalities”, respectively</a:t>
+            </a:r>
+            <a:endParaRPr lang="en-US" sz="1200" dirty="0"/>
+          </a:p>
+        </p:txBody>
+      </p:sp>
+      <p:sp>
+        <p:nvSpPr>
+          <p:cNvPr id="17" name="TextBox 16"/>
+          <p:cNvSpPr txBox="1"/>
+          <p:nvPr/>
+        </p:nvSpPr>
+        <p:spPr>
+          <a:xfrm>
+            <a:off x="6288942" y="5551976"/>
+            <a:ext cx="5743757" cy="461665"/>
+          </a:xfrm>
+          <a:prstGeom prst="rect">
+            <a:avLst/>
+          </a:prstGeom>
+          <a:noFill/>
+        </p:spPr>
+        <p:txBody>
+          <a:bodyPr wrap="square" rtlCol="0">
+            <a:spAutoFit/>
+          </a:bodyPr>
+          <a:lstStyle/>
+          <a:p>
+            <a:r>
+              <a:rPr lang="en-US" sz="1200" dirty="0" smtClean="0"/>
+              <a:t>Cluster 21 disease/function maps. Small maps represent “ophthalmic disease”, “organismal injury and abnormalities”, and “cellular </a:t>
+            </a:r>
+            <a:r>
+              <a:rPr lang="en-US" sz="1200" dirty="0" smtClean="0"/>
+              <a:t>movement”, </a:t>
+            </a:r>
+            <a:r>
+              <a:rPr lang="en-US" sz="1200" dirty="0" smtClean="0"/>
+              <a:t>respectively</a:t>
+            </a:r>
+            <a:endParaRPr lang="en-US" sz="1200" dirty="0"/>
+          </a:p>
+        </p:txBody>
+      </p:sp>
+      <p:grpSp>
+        <p:nvGrpSpPr>
+          <p:cNvPr id="20" name="Group 19"/>
+          <p:cNvGrpSpPr/>
+          <p:nvPr/>
+        </p:nvGrpSpPr>
+        <p:grpSpPr>
+          <a:xfrm>
+            <a:off x="101112" y="117230"/>
+            <a:ext cx="5738579" cy="2291862"/>
+            <a:chOff x="101112" y="117230"/>
+            <a:chExt cx="5738579" cy="2291862"/>
+          </a:xfrm>
+        </p:grpSpPr>
+        <p:pic>
+          <p:nvPicPr>
+            <p:cNvPr id="2" name="Picture 1"/>
+            <p:cNvPicPr>
+              <a:picLocks noChangeAspect="1"/>
+            </p:cNvPicPr>
+            <p:nvPr/>
+          </p:nvPicPr>
+          <p:blipFill>
+            <a:blip r:embed="rId3">
+              <a:extLst>
+                <a:ext uri="{28A0092B-C50C-407E-A947-70E740481C1C}">
+                  <a14:useLocalDpi xmlns:a14="http://schemas.microsoft.com/office/drawing/2010/main" val="0"/>
+                </a:ext>
+              </a:extLst>
+            </a:blip>
+            <a:stretch>
+              <a:fillRect/>
+            </a:stretch>
+          </p:blipFill>
+          <p:spPr>
+            <a:xfrm>
+              <a:off x="101112" y="117230"/>
+              <a:ext cx="4634280" cy="2291862"/>
+            </a:xfrm>
+            <a:prstGeom prst="rect">
+              <a:avLst/>
+            </a:prstGeom>
+            <a:noFill/>
+            <a:ln>
+              <a:noFill/>
+            </a:ln>
+          </p:spPr>
+        </p:pic>
+        <p:pic>
+          <p:nvPicPr>
+            <p:cNvPr id="6" name="Picture 5"/>
+            <p:cNvPicPr>
+              <a:picLocks noChangeAspect="1"/>
+            </p:cNvPicPr>
+            <p:nvPr/>
+          </p:nvPicPr>
+          <p:blipFill>
+            <a:blip r:embed="rId4" cstate="print">
+              <a:extLst>
+                <a:ext uri="{28A0092B-C50C-407E-A947-70E740481C1C}">
+                  <a14:useLocalDpi xmlns:a14="http://schemas.microsoft.com/office/drawing/2010/main" val="0"/>
+                </a:ext>
+              </a:extLst>
+            </a:blip>
+            <a:stretch>
+              <a:fillRect/>
+            </a:stretch>
+          </p:blipFill>
+          <p:spPr>
+            <a:xfrm>
+              <a:off x="4823315" y="117230"/>
+              <a:ext cx="1016376" cy="500796"/>
+            </a:xfrm>
+            <a:prstGeom prst="rect">
+              <a:avLst/>
+            </a:prstGeom>
+            <a:ln>
+              <a:solidFill>
+                <a:srgbClr val="00B0F0"/>
+              </a:solidFill>
+            </a:ln>
+          </p:spPr>
+        </p:pic>
+        <p:pic>
+          <p:nvPicPr>
+            <p:cNvPr id="7" name="Picture 6"/>
+            <p:cNvPicPr>
+              <a:picLocks noChangeAspect="1"/>
+            </p:cNvPicPr>
+            <p:nvPr/>
+          </p:nvPicPr>
+          <p:blipFill>
+            <a:blip r:embed="rId5" cstate="print">
+              <a:extLst>
+                <a:ext uri="{28A0092B-C50C-407E-A947-70E740481C1C}">
+                  <a14:useLocalDpi xmlns:a14="http://schemas.microsoft.com/office/drawing/2010/main" val="0"/>
+                </a:ext>
+              </a:extLst>
+            </a:blip>
+            <a:stretch>
+              <a:fillRect/>
+            </a:stretch>
+          </p:blipFill>
+          <p:spPr>
+            <a:xfrm>
+              <a:off x="4822420" y="762365"/>
+              <a:ext cx="1017271" cy="500796"/>
+            </a:xfrm>
+            <a:prstGeom prst="rect">
+              <a:avLst/>
+            </a:prstGeom>
+            <a:ln>
+              <a:solidFill>
+                <a:srgbClr val="FF0000"/>
+              </a:solidFill>
+            </a:ln>
+          </p:spPr>
+        </p:pic>
+        <p:sp>
+          <p:nvSpPr>
+            <p:cNvPr id="18" name="Rectangle 17"/>
+            <p:cNvSpPr/>
+            <p:nvPr/>
+          </p:nvSpPr>
+          <p:spPr>
+            <a:xfrm>
+              <a:off x="110833" y="1298575"/>
+              <a:ext cx="2086267" cy="1092200"/>
+            </a:xfrm>
+            <a:prstGeom prst="rect">
+              <a:avLst/>
+            </a:prstGeom>
+            <a:noFill/>
+            <a:ln>
+              <a:solidFill>
+                <a:srgbClr val="00B0F0"/>
+              </a:solidFill>
+            </a:ln>
+          </p:spPr>
+          <p:style>
+            <a:lnRef idx="2">
+              <a:schemeClr val="accent1">
+                <a:shade val="50000"/>
+              </a:schemeClr>
+            </a:lnRef>
+            <a:fillRef idx="1">
+              <a:schemeClr val="accent1"/>
+            </a:fillRef>
+            <a:effectRef idx="0">
+              <a:schemeClr val="accent1"/>
+            </a:effectRef>
+            <a:fontRef idx="minor">
+              <a:schemeClr val="lt1"/>
+            </a:fontRef>
+          </p:style>
+          <p:txBody>
+            <a:bodyPr rtlCol="0" anchor="ctr"/>
+            <a:lstStyle/>
+            <a:p>
+              <a:pPr algn="ctr"/>
+              <a:endParaRPr lang="en-US"/>
+            </a:p>
+          </p:txBody>
+        </p:sp>
+        <p:sp>
+          <p:nvSpPr>
+            <p:cNvPr id="19" name="Rectangle 18"/>
+            <p:cNvSpPr/>
+            <p:nvPr/>
+          </p:nvSpPr>
+          <p:spPr>
+            <a:xfrm>
+              <a:off x="110833" y="117230"/>
+              <a:ext cx="2086267" cy="1168645"/>
+            </a:xfrm>
+            <a:prstGeom prst="rect">
+              <a:avLst/>
+            </a:prstGeom>
+            <a:noFill/>
+            <a:ln>
+              <a:solidFill>
+                <a:srgbClr val="FF0000"/>
+              </a:solidFill>
+            </a:ln>
+          </p:spPr>
+          <p:style>
+            <a:lnRef idx="2">
+              <a:schemeClr val="accent1">
+                <a:shade val="50000"/>
+              </a:schemeClr>
+            </a:lnRef>
+            <a:fillRef idx="1">
+              <a:schemeClr val="accent1"/>
+            </a:fillRef>
+            <a:effectRef idx="0">
+              <a:schemeClr val="accent1"/>
+            </a:effectRef>
+            <a:fontRef idx="minor">
+              <a:schemeClr val="lt1"/>
+            </a:fontRef>
+          </p:style>
+          <p:txBody>
+            <a:bodyPr rtlCol="0" anchor="ctr"/>
+            <a:lstStyle/>
+            <a:p>
+              <a:pPr algn="ctr"/>
+              <a:endParaRPr lang="en-US"/>
+            </a:p>
+          </p:txBody>
+        </p:sp>
+      </p:grpSp>
+      <p:grpSp>
+        <p:nvGrpSpPr>
+          <p:cNvPr id="29" name="Group 28"/>
+          <p:cNvGrpSpPr/>
+          <p:nvPr/>
+        </p:nvGrpSpPr>
+        <p:grpSpPr>
+          <a:xfrm>
+            <a:off x="6375685" y="117230"/>
+            <a:ext cx="5786598" cy="2291862"/>
+            <a:chOff x="6375685" y="117230"/>
+            <a:chExt cx="5786598" cy="2291862"/>
+          </a:xfrm>
+        </p:grpSpPr>
+        <p:pic>
+          <p:nvPicPr>
+            <p:cNvPr id="3" name="Picture 2"/>
+            <p:cNvPicPr>
+              <a:picLocks noChangeAspect="1"/>
+            </p:cNvPicPr>
+            <p:nvPr/>
+          </p:nvPicPr>
+          <p:blipFill>
+            <a:blip r:embed="rId6">
+              <a:extLst>
+                <a:ext uri="{28A0092B-C50C-407E-A947-70E740481C1C}">
+                  <a14:useLocalDpi xmlns:a14="http://schemas.microsoft.com/office/drawing/2010/main" val="0"/>
+                </a:ext>
+              </a:extLst>
+            </a:blip>
+            <a:stretch>
+              <a:fillRect/>
+            </a:stretch>
+          </p:blipFill>
+          <p:spPr>
+            <a:xfrm>
+              <a:off x="6375685" y="121992"/>
+              <a:ext cx="4641592" cy="2287100"/>
+            </a:xfrm>
+            <a:prstGeom prst="rect">
+              <a:avLst/>
+            </a:prstGeom>
+          </p:spPr>
+        </p:pic>
+        <p:pic>
+          <p:nvPicPr>
+            <p:cNvPr id="8" name="Picture 7"/>
+            <p:cNvPicPr>
+              <a:picLocks noChangeAspect="1"/>
+            </p:cNvPicPr>
+            <p:nvPr/>
+          </p:nvPicPr>
+          <p:blipFill>
+            <a:blip r:embed="rId7" cstate="print">
+              <a:extLst>
+                <a:ext uri="{28A0092B-C50C-407E-A947-70E740481C1C}">
+                  <a14:useLocalDpi xmlns:a14="http://schemas.microsoft.com/office/drawing/2010/main" val="0"/>
+                </a:ext>
+              </a:extLst>
+            </a:blip>
+            <a:stretch>
+              <a:fillRect/>
+            </a:stretch>
+          </p:blipFill>
+          <p:spPr>
+            <a:xfrm>
+              <a:off x="11144090" y="117230"/>
+              <a:ext cx="977228" cy="301504"/>
+            </a:xfrm>
+            <a:prstGeom prst="rect">
+              <a:avLst/>
+            </a:prstGeom>
+            <a:ln>
+              <a:solidFill>
+                <a:srgbClr val="00B0F0"/>
+              </a:solidFill>
+            </a:ln>
+          </p:spPr>
+        </p:pic>
+        <p:pic>
+          <p:nvPicPr>
+            <p:cNvPr id="9" name="Picture 8"/>
+            <p:cNvPicPr>
+              <a:picLocks noChangeAspect="1"/>
+            </p:cNvPicPr>
+            <p:nvPr/>
+          </p:nvPicPr>
+          <p:blipFill>
+            <a:blip r:embed="rId8" cstate="print">
+              <a:extLst>
+                <a:ext uri="{28A0092B-C50C-407E-A947-70E740481C1C}">
+                  <a14:useLocalDpi xmlns:a14="http://schemas.microsoft.com/office/drawing/2010/main" val="0"/>
+                </a:ext>
+              </a:extLst>
+            </a:blip>
+            <a:stretch>
+              <a:fillRect/>
+            </a:stretch>
+          </p:blipFill>
+          <p:spPr>
+            <a:xfrm>
+              <a:off x="11144090" y="618026"/>
+              <a:ext cx="1018193" cy="500796"/>
+            </a:xfrm>
+            <a:prstGeom prst="rect">
+              <a:avLst/>
+            </a:prstGeom>
+            <a:ln>
+              <a:solidFill>
+                <a:srgbClr val="FF0000"/>
+              </a:solidFill>
+            </a:ln>
+          </p:spPr>
+        </p:pic>
+        <p:sp>
+          <p:nvSpPr>
+            <p:cNvPr id="21" name="Rectangle 20"/>
+            <p:cNvSpPr/>
+            <p:nvPr/>
+          </p:nvSpPr>
+          <p:spPr>
+            <a:xfrm>
+              <a:off x="6375685" y="1364456"/>
+              <a:ext cx="1842009" cy="1026319"/>
+            </a:xfrm>
+            <a:prstGeom prst="rect">
+              <a:avLst/>
+            </a:prstGeom>
+            <a:noFill/>
+            <a:ln>
+              <a:solidFill>
+                <a:srgbClr val="00B0F0"/>
+              </a:solidFill>
+            </a:ln>
+          </p:spPr>
+          <p:style>
+            <a:lnRef idx="2">
+              <a:schemeClr val="accent1">
+                <a:shade val="50000"/>
+              </a:schemeClr>
+            </a:lnRef>
+            <a:fillRef idx="1">
+              <a:schemeClr val="accent1"/>
+            </a:fillRef>
+            <a:effectRef idx="0">
+              <a:schemeClr val="accent1"/>
+            </a:effectRef>
+            <a:fontRef idx="minor">
+              <a:schemeClr val="lt1"/>
+            </a:fontRef>
+          </p:style>
+          <p:txBody>
+            <a:bodyPr rtlCol="0" anchor="ctr"/>
+            <a:lstStyle/>
+            <a:p>
+              <a:pPr algn="ctr"/>
+              <a:endParaRPr lang="en-US"/>
+            </a:p>
+          </p:txBody>
+        </p:sp>
+        <p:sp>
+          <p:nvSpPr>
+            <p:cNvPr id="22" name="Rectangle 21"/>
+            <p:cNvSpPr/>
+            <p:nvPr/>
+          </p:nvSpPr>
+          <p:spPr>
+            <a:xfrm>
+              <a:off x="6375685" y="117230"/>
+              <a:ext cx="1842009" cy="1230558"/>
+            </a:xfrm>
+            <a:prstGeom prst="rect">
+              <a:avLst/>
+            </a:prstGeom>
+            <a:noFill/>
+            <a:ln>
+              <a:solidFill>
+                <a:srgbClr val="FF0000"/>
+              </a:solidFill>
+            </a:ln>
+          </p:spPr>
+          <p:style>
+            <a:lnRef idx="2">
+              <a:schemeClr val="accent1">
+                <a:shade val="50000"/>
+              </a:schemeClr>
+            </a:lnRef>
+            <a:fillRef idx="1">
+              <a:schemeClr val="accent1"/>
+            </a:fillRef>
+            <a:effectRef idx="0">
+              <a:schemeClr val="accent1"/>
+            </a:effectRef>
+            <a:fontRef idx="minor">
+              <a:schemeClr val="lt1"/>
+            </a:fontRef>
+          </p:style>
+          <p:txBody>
+            <a:bodyPr rtlCol="0" anchor="ctr"/>
+            <a:lstStyle/>
+            <a:p>
+              <a:pPr algn="ctr"/>
+              <a:endParaRPr lang="en-US"/>
+            </a:p>
+          </p:txBody>
+        </p:sp>
+      </p:grpSp>
+      <p:grpSp>
+        <p:nvGrpSpPr>
+          <p:cNvPr id="27" name="Group 26"/>
+          <p:cNvGrpSpPr/>
+          <p:nvPr/>
+        </p:nvGrpSpPr>
+        <p:grpSpPr>
+          <a:xfrm>
+            <a:off x="110834" y="3264875"/>
+            <a:ext cx="5728857" cy="2287102"/>
+            <a:chOff x="110834" y="3264875"/>
+            <a:chExt cx="5728857" cy="2287102"/>
+          </a:xfrm>
+        </p:grpSpPr>
+        <p:pic>
+          <p:nvPicPr>
+            <p:cNvPr id="4" name="Picture 3"/>
+            <p:cNvPicPr>
+              <a:picLocks noChangeAspect="1"/>
+            </p:cNvPicPr>
+            <p:nvPr/>
+          </p:nvPicPr>
+          <p:blipFill>
+            <a:blip r:embed="rId9">
+              <a:extLst>
+                <a:ext uri="{28A0092B-C50C-407E-A947-70E740481C1C}">
+                  <a14:useLocalDpi xmlns:a14="http://schemas.microsoft.com/office/drawing/2010/main" val="0"/>
+                </a:ext>
+              </a:extLst>
+            </a:blip>
+            <a:stretch>
+              <a:fillRect/>
+            </a:stretch>
+          </p:blipFill>
+          <p:spPr>
+            <a:xfrm>
+              <a:off x="110834" y="3264877"/>
+              <a:ext cx="4624558" cy="2287100"/>
+            </a:xfrm>
+            <a:prstGeom prst="rect">
+              <a:avLst/>
+            </a:prstGeom>
+          </p:spPr>
+        </p:pic>
+        <p:pic>
+          <p:nvPicPr>
+            <p:cNvPr id="10" name="Picture 9"/>
+            <p:cNvPicPr>
+              <a:picLocks noChangeAspect="1"/>
+            </p:cNvPicPr>
+            <p:nvPr/>
+          </p:nvPicPr>
+          <p:blipFill>
+            <a:blip r:embed="rId10" cstate="print">
+              <a:extLst>
+                <a:ext uri="{28A0092B-C50C-407E-A947-70E740481C1C}">
+                  <a14:useLocalDpi xmlns:a14="http://schemas.microsoft.com/office/drawing/2010/main" val="0"/>
+                </a:ext>
+              </a:extLst>
+            </a:blip>
+            <a:stretch>
+              <a:fillRect/>
+            </a:stretch>
+          </p:blipFill>
+          <p:spPr>
+            <a:xfrm>
+              <a:off x="4822420" y="3264877"/>
+              <a:ext cx="1017271" cy="501719"/>
+            </a:xfrm>
+            <a:prstGeom prst="rect">
+              <a:avLst/>
+            </a:prstGeom>
+            <a:ln>
+              <a:solidFill>
+                <a:srgbClr val="FFC000"/>
+              </a:solidFill>
+            </a:ln>
+          </p:spPr>
+        </p:pic>
+        <p:sp>
+          <p:nvSpPr>
+            <p:cNvPr id="23" name="Rectangle 22"/>
+            <p:cNvSpPr/>
+            <p:nvPr/>
+          </p:nvSpPr>
+          <p:spPr>
+            <a:xfrm>
+              <a:off x="4081463" y="3264875"/>
+              <a:ext cx="633416" cy="578463"/>
+            </a:xfrm>
+            <a:prstGeom prst="rect">
+              <a:avLst/>
+            </a:prstGeom>
+            <a:noFill/>
+            <a:ln>
+              <a:solidFill>
+                <a:srgbClr val="FFC000"/>
+              </a:solidFill>
+            </a:ln>
+          </p:spPr>
+          <p:style>
+            <a:lnRef idx="2">
+              <a:schemeClr val="accent1">
+                <a:shade val="50000"/>
+              </a:schemeClr>
+            </a:lnRef>
+            <a:fillRef idx="1">
+              <a:schemeClr val="accent1"/>
+            </a:fillRef>
+            <a:effectRef idx="0">
+              <a:schemeClr val="accent1"/>
+            </a:effectRef>
+            <a:fontRef idx="minor">
+              <a:schemeClr val="lt1"/>
+            </a:fontRef>
+          </p:style>
+          <p:txBody>
+            <a:bodyPr rtlCol="0" anchor="ctr"/>
+            <a:lstStyle/>
+            <a:p>
+              <a:pPr algn="ctr"/>
+              <a:endParaRPr lang="en-US"/>
+            </a:p>
+          </p:txBody>
+        </p:sp>
+      </p:grpSp>
+      <p:grpSp>
+        <p:nvGrpSpPr>
+          <p:cNvPr id="28" name="Group 27"/>
+          <p:cNvGrpSpPr/>
+          <p:nvPr/>
+        </p:nvGrpSpPr>
+        <p:grpSpPr>
+          <a:xfrm>
+            <a:off x="6369294" y="3264875"/>
+            <a:ext cx="5752024" cy="2287102"/>
+            <a:chOff x="6369294" y="3264875"/>
+            <a:chExt cx="5752024" cy="2287102"/>
+          </a:xfrm>
+        </p:grpSpPr>
+        <p:pic>
+          <p:nvPicPr>
+            <p:cNvPr id="5" name="Picture 4"/>
+            <p:cNvPicPr>
+              <a:picLocks noChangeAspect="1"/>
+            </p:cNvPicPr>
+            <p:nvPr/>
+          </p:nvPicPr>
+          <p:blipFill>
+            <a:blip r:embed="rId11">
+              <a:extLst>
+                <a:ext uri="{28A0092B-C50C-407E-A947-70E740481C1C}">
+                  <a14:useLocalDpi xmlns:a14="http://schemas.microsoft.com/office/drawing/2010/main" val="0"/>
+                </a:ext>
+              </a:extLst>
+            </a:blip>
+            <a:stretch>
+              <a:fillRect/>
+            </a:stretch>
+          </p:blipFill>
+          <p:spPr>
+            <a:xfrm>
+              <a:off x="6369294" y="3264877"/>
+              <a:ext cx="4654375" cy="2287100"/>
+            </a:xfrm>
+            <a:prstGeom prst="rect">
+              <a:avLst/>
+            </a:prstGeom>
+          </p:spPr>
+        </p:pic>
+        <p:pic>
+          <p:nvPicPr>
+            <p:cNvPr id="11" name="Picture 10"/>
+            <p:cNvPicPr>
+              <a:picLocks noChangeAspect="1"/>
+            </p:cNvPicPr>
+            <p:nvPr/>
+          </p:nvPicPr>
+          <p:blipFill>
+            <a:blip r:embed="rId12" cstate="print">
+              <a:extLst>
+                <a:ext uri="{28A0092B-C50C-407E-A947-70E740481C1C}">
+                  <a14:useLocalDpi xmlns:a14="http://schemas.microsoft.com/office/drawing/2010/main" val="0"/>
+                </a:ext>
+              </a:extLst>
+            </a:blip>
+            <a:stretch>
+              <a:fillRect/>
+            </a:stretch>
+          </p:blipFill>
+          <p:spPr>
+            <a:xfrm>
+              <a:off x="11104020" y="3264876"/>
+              <a:ext cx="1017298" cy="501719"/>
+            </a:xfrm>
+            <a:prstGeom prst="rect">
+              <a:avLst/>
+            </a:prstGeom>
+            <a:ln>
+              <a:solidFill>
+                <a:srgbClr val="00B0F0"/>
+              </a:solidFill>
+            </a:ln>
+          </p:spPr>
+        </p:pic>
+        <p:pic>
+          <p:nvPicPr>
+            <p:cNvPr id="12" name="Picture 11"/>
+            <p:cNvPicPr>
+              <a:picLocks noChangeAspect="1"/>
+            </p:cNvPicPr>
+            <p:nvPr/>
+          </p:nvPicPr>
+          <p:blipFill>
+            <a:blip r:embed="rId13" cstate="print">
+              <a:extLst>
+                <a:ext uri="{28A0092B-C50C-407E-A947-70E740481C1C}">
+                  <a14:useLocalDpi xmlns:a14="http://schemas.microsoft.com/office/drawing/2010/main" val="0"/>
+                </a:ext>
+              </a:extLst>
+            </a:blip>
+            <a:stretch>
+              <a:fillRect/>
+            </a:stretch>
+          </p:blipFill>
+          <p:spPr>
+            <a:xfrm>
+              <a:off x="11102171" y="3964964"/>
+              <a:ext cx="1019147" cy="500796"/>
+            </a:xfrm>
+            <a:prstGeom prst="rect">
+              <a:avLst/>
+            </a:prstGeom>
+            <a:ln>
+              <a:solidFill>
+                <a:srgbClr val="FF0000"/>
+              </a:solidFill>
+            </a:ln>
+          </p:spPr>
+        </p:pic>
+        <p:pic>
+          <p:nvPicPr>
+            <p:cNvPr id="13" name="Picture 12"/>
+            <p:cNvPicPr>
+              <a:picLocks noChangeAspect="1"/>
+            </p:cNvPicPr>
+            <p:nvPr/>
+          </p:nvPicPr>
+          <p:blipFill>
+            <a:blip r:embed="rId14" cstate="print">
+              <a:extLst>
+                <a:ext uri="{28A0092B-C50C-407E-A947-70E740481C1C}">
+                  <a14:useLocalDpi xmlns:a14="http://schemas.microsoft.com/office/drawing/2010/main" val="0"/>
+                </a:ext>
+              </a:extLst>
+            </a:blip>
+            <a:stretch>
+              <a:fillRect/>
+            </a:stretch>
+          </p:blipFill>
+          <p:spPr>
+            <a:xfrm>
+              <a:off x="11102171" y="4664129"/>
+              <a:ext cx="1017271" cy="501706"/>
+            </a:xfrm>
+            <a:prstGeom prst="rect">
+              <a:avLst/>
+            </a:prstGeom>
+            <a:ln>
+              <a:solidFill>
+                <a:srgbClr val="92D050"/>
+              </a:solidFill>
+            </a:ln>
+          </p:spPr>
+        </p:pic>
+        <p:sp>
+          <p:nvSpPr>
+            <p:cNvPr id="24" name="Rectangle 23"/>
+            <p:cNvSpPr/>
+            <p:nvPr/>
+          </p:nvSpPr>
+          <p:spPr>
+            <a:xfrm>
+              <a:off x="8777288" y="3788731"/>
+              <a:ext cx="514350" cy="554669"/>
+            </a:xfrm>
+            <a:prstGeom prst="rect">
+              <a:avLst/>
+            </a:prstGeom>
+            <a:noFill/>
+            <a:ln>
+              <a:solidFill>
+                <a:srgbClr val="00B0F0"/>
+              </a:solidFill>
+            </a:ln>
+          </p:spPr>
+          <p:style>
+            <a:lnRef idx="2">
+              <a:schemeClr val="accent1">
+                <a:shade val="50000"/>
+              </a:schemeClr>
+            </a:lnRef>
+            <a:fillRef idx="1">
+              <a:schemeClr val="accent1"/>
+            </a:fillRef>
+            <a:effectRef idx="0">
+              <a:schemeClr val="accent1"/>
+            </a:effectRef>
+            <a:fontRef idx="minor">
+              <a:schemeClr val="lt1"/>
+            </a:fontRef>
+          </p:style>
+          <p:txBody>
+            <a:bodyPr rtlCol="0" anchor="ctr"/>
+            <a:lstStyle/>
+            <a:p>
+              <a:pPr algn="ctr"/>
+              <a:endParaRPr lang="en-US"/>
+            </a:p>
+          </p:txBody>
+        </p:sp>
+        <p:sp>
+          <p:nvSpPr>
+            <p:cNvPr id="25" name="Rectangle 24"/>
+            <p:cNvSpPr/>
+            <p:nvPr/>
+          </p:nvSpPr>
+          <p:spPr>
+            <a:xfrm>
+              <a:off x="6371676" y="3264875"/>
+              <a:ext cx="800650" cy="1200885"/>
+            </a:xfrm>
+            <a:prstGeom prst="rect">
+              <a:avLst/>
+            </a:prstGeom>
+            <a:noFill/>
+            <a:ln>
+              <a:solidFill>
+                <a:srgbClr val="FF0000"/>
+              </a:solidFill>
+            </a:ln>
+          </p:spPr>
+          <p:style>
+            <a:lnRef idx="2">
+              <a:schemeClr val="accent1">
+                <a:shade val="50000"/>
+              </a:schemeClr>
+            </a:lnRef>
+            <a:fillRef idx="1">
+              <a:schemeClr val="accent1"/>
+            </a:fillRef>
+            <a:effectRef idx="0">
+              <a:schemeClr val="accent1"/>
+            </a:effectRef>
+            <a:fontRef idx="minor">
+              <a:schemeClr val="lt1"/>
+            </a:fontRef>
+          </p:style>
+          <p:txBody>
+            <a:bodyPr rtlCol="0" anchor="ctr"/>
+            <a:lstStyle/>
+            <a:p>
+              <a:pPr algn="ctr"/>
+              <a:endParaRPr lang="en-US"/>
+            </a:p>
+          </p:txBody>
+        </p:sp>
+        <p:sp>
+          <p:nvSpPr>
+            <p:cNvPr id="26" name="Rectangle 25"/>
+            <p:cNvSpPr/>
+            <p:nvPr/>
+          </p:nvSpPr>
+          <p:spPr>
+            <a:xfrm>
+              <a:off x="7191375" y="3264875"/>
+              <a:ext cx="923925" cy="811825"/>
+            </a:xfrm>
+            <a:prstGeom prst="rect">
+              <a:avLst/>
+            </a:prstGeom>
+            <a:noFill/>
+            <a:ln>
+              <a:solidFill>
+                <a:srgbClr val="92D050"/>
+              </a:solidFill>
+            </a:ln>
+          </p:spPr>
+          <p:style>
+            <a:lnRef idx="2">
+              <a:schemeClr val="accent1">
+                <a:shade val="50000"/>
+              </a:schemeClr>
+            </a:lnRef>
+            <a:fillRef idx="1">
+              <a:schemeClr val="accent1"/>
+            </a:fillRef>
+            <a:effectRef idx="0">
+              <a:schemeClr val="accent1"/>
+            </a:effectRef>
+            <a:fontRef idx="minor">
+              <a:schemeClr val="lt1"/>
+            </a:fontRef>
+          </p:style>
+          <p:txBody>
+            <a:bodyPr rtlCol="0" anchor="ctr"/>
+            <a:lstStyle/>
+            <a:p>
+              <a:pPr algn="ctr"/>
+              <a:endParaRPr lang="en-US"/>
+            </a:p>
+          </p:txBody>
+        </p:sp>
+      </p:grpSp>
       <p:pic>
         <p:nvPicPr>
-          <p:cNvPr id="2" name="Picture 1"/>
+          <p:cNvPr id="30" name="Picture 29"/>
           <p:cNvPicPr>
             <a:picLocks noChangeAspect="1"/>
           </p:cNvPicPr>
           <p:nvPr/>
         </p:nvPicPr>
         <p:blipFill>
-          <a:blip r:embed="rId3">
+          <a:blip r:embed="rId15" cstate="print">
             <a:extLst>
               <a:ext uri="{28A0092B-C50C-407E-A947-70E740481C1C}">
                 <a14:useLocalDpi xmlns:a14="http://schemas.microsoft.com/office/drawing/2010/main" val="0"/>
@@ -6559,24 +7760,75 @@
         </p:blipFill>
         <p:spPr>
           <a:xfrm>
-            <a:off x="101112" y="117230"/>
-            <a:ext cx="4634280" cy="2291862"/>
+            <a:off x="4822420" y="3913857"/>
+            <a:ext cx="974365" cy="301505"/>
           </a:xfrm>
           <a:prstGeom prst="rect">
             <a:avLst/>
           </a:prstGeom>
+          <a:ln>
+            <a:solidFill>
+              <a:srgbClr val="FF0000"/>
+            </a:solidFill>
+          </a:ln>
         </p:spPr>
       </p:pic>
+      <p:sp>
+        <p:nvSpPr>
+          <p:cNvPr id="31" name="Rectangle 30"/>
+          <p:cNvSpPr/>
+          <p:nvPr/>
+        </p:nvSpPr>
+        <p:spPr>
+          <a:xfrm>
+            <a:off x="1362075" y="3264875"/>
+            <a:ext cx="1990725" cy="1745275"/>
+          </a:xfrm>
+          <a:prstGeom prst="rect">
+            <a:avLst/>
+          </a:prstGeom>
+          <a:noFill/>
+          <a:ln>
+            <a:solidFill>
+              <a:srgbClr val="FF0000"/>
+            </a:solidFill>
+          </a:ln>
+        </p:spPr>
+        <p:style>
+          <a:lnRef idx="2">
+            <a:schemeClr val="accent1">
+              <a:shade val="50000"/>
+            </a:schemeClr>
+          </a:lnRef>
+          <a:fillRef idx="1">
+            <a:schemeClr val="accent1"/>
+          </a:fillRef>
+          <a:effectRef idx="0">
+            <a:schemeClr val="accent1"/>
+          </a:effectRef>
+          <a:fontRef idx="minor">
+            <a:schemeClr val="lt1"/>
+          </a:fontRef>
+        </p:style>
+        <p:txBody>
+          <a:bodyPr rtlCol="0" anchor="ctr"/>
+          <a:lstStyle/>
+          <a:p>
+            <a:pPr algn="ctr"/>
+            <a:endParaRPr lang="en-US"/>
+          </a:p>
+        </p:txBody>
+      </p:sp>
       <p:pic>
         <p:nvPicPr>
-          <p:cNvPr id="3" name="Picture 2"/>
+          <p:cNvPr id="32" name="Picture 31"/>
           <p:cNvPicPr>
             <a:picLocks noChangeAspect="1"/>
           </p:cNvPicPr>
           <p:nvPr/>
         </p:nvPicPr>
         <p:blipFill>
-          <a:blip r:embed="rId4">
+          <a:blip r:embed="rId16" cstate="print">
             <a:extLst>
               <a:ext uri="{28A0092B-C50C-407E-A947-70E740481C1C}">
                 <a14:useLocalDpi xmlns:a14="http://schemas.microsoft.com/office/drawing/2010/main" val="0"/>
@@ -6589,8 +7841,8 @@
         </p:blipFill>
         <p:spPr>
           <a:xfrm>
-            <a:off x="6375685" y="121992"/>
-            <a:ext cx="4641592" cy="2287100"/>
+            <a:off x="4820749" y="1265542"/>
+            <a:ext cx="1018942" cy="64976"/>
           </a:xfrm>
           <a:prstGeom prst="rect">
             <a:avLst/>
@@ -6599,14 +7851,14 @@
       </p:pic>
       <p:pic>
         <p:nvPicPr>
-          <p:cNvPr id="4" name="Picture 3"/>
+          <p:cNvPr id="33" name="Picture 32"/>
           <p:cNvPicPr>
             <a:picLocks noChangeAspect="1"/>
           </p:cNvPicPr>
           <p:nvPr/>
         </p:nvPicPr>
         <p:blipFill>
-          <a:blip r:embed="rId5">
+          <a:blip r:embed="rId17" cstate="print">
             <a:extLst>
               <a:ext uri="{28A0092B-C50C-407E-A947-70E740481C1C}">
                 <a14:useLocalDpi xmlns:a14="http://schemas.microsoft.com/office/drawing/2010/main" val="0"/>
@@ -6619,8 +7871,8 @@
         </p:blipFill>
         <p:spPr>
           <a:xfrm>
-            <a:off x="110834" y="3264877"/>
-            <a:ext cx="4624558" cy="2287100"/>
+            <a:off x="11023669" y="1180946"/>
+            <a:ext cx="1217683" cy="74120"/>
           </a:xfrm>
           <a:prstGeom prst="rect">
             <a:avLst/>
@@ -6629,14 +7881,14 @@
       </p:pic>
       <p:pic>
         <p:nvPicPr>
-          <p:cNvPr id="5" name="Picture 4"/>
+          <p:cNvPr id="34" name="Picture 33"/>
           <p:cNvPicPr>
             <a:picLocks noChangeAspect="1"/>
           </p:cNvPicPr>
           <p:nvPr/>
         </p:nvPicPr>
         <p:blipFill>
-          <a:blip r:embed="rId6">
+          <a:blip r:embed="rId18" cstate="print">
             <a:extLst>
               <a:ext uri="{28A0092B-C50C-407E-A947-70E740481C1C}">
                 <a14:useLocalDpi xmlns:a14="http://schemas.microsoft.com/office/drawing/2010/main" val="0"/>
@@ -6649,8 +7901,8 @@
         </p:blipFill>
         <p:spPr>
           <a:xfrm>
-            <a:off x="6369294" y="3264877"/>
-            <a:ext cx="4654375" cy="2287100"/>
+            <a:off x="4805270" y="4342554"/>
+            <a:ext cx="1181363" cy="73398"/>
           </a:xfrm>
           <a:prstGeom prst="rect">
             <a:avLst/>
@@ -6659,14 +7911,14 @@
       </p:pic>
       <p:pic>
         <p:nvPicPr>
-          <p:cNvPr id="6" name="Picture 5"/>
+          <p:cNvPr id="35" name="Picture 34"/>
           <p:cNvPicPr>
             <a:picLocks noChangeAspect="1"/>
           </p:cNvPicPr>
           <p:nvPr/>
         </p:nvPicPr>
         <p:blipFill>
-          <a:blip r:embed="rId7" cstate="print">
+          <a:blip r:embed="rId19" cstate="print">
             <a:extLst>
               <a:ext uri="{28A0092B-C50C-407E-A947-70E740481C1C}">
                 <a14:useLocalDpi xmlns:a14="http://schemas.microsoft.com/office/drawing/2010/main" val="0"/>
@@ -6679,344 +7931,14 @@
         </p:blipFill>
         <p:spPr>
           <a:xfrm>
-            <a:off x="4823315" y="117230"/>
-            <a:ext cx="1016376" cy="500796"/>
+            <a:off x="11073841" y="5273261"/>
+            <a:ext cx="958858" cy="59574"/>
           </a:xfrm>
           <a:prstGeom prst="rect">
             <a:avLst/>
           </a:prstGeom>
         </p:spPr>
       </p:pic>
-      <p:pic>
-        <p:nvPicPr>
-          <p:cNvPr id="7" name="Picture 6"/>
-          <p:cNvPicPr>
-            <a:picLocks noChangeAspect="1"/>
-          </p:cNvPicPr>
-          <p:nvPr/>
-        </p:nvPicPr>
-        <p:blipFill>
-          <a:blip r:embed="rId8" cstate="print">
-            <a:extLst>
-              <a:ext uri="{28A0092B-C50C-407E-A947-70E740481C1C}">
-                <a14:useLocalDpi xmlns:a14="http://schemas.microsoft.com/office/drawing/2010/main" val="0"/>
-              </a:ext>
-            </a:extLst>
-          </a:blip>
-          <a:stretch>
-            <a:fillRect/>
-          </a:stretch>
-        </p:blipFill>
-        <p:spPr>
-          <a:xfrm>
-            <a:off x="4822420" y="762365"/>
-            <a:ext cx="1017271" cy="500796"/>
-          </a:xfrm>
-          <a:prstGeom prst="rect">
-            <a:avLst/>
-          </a:prstGeom>
-        </p:spPr>
-      </p:pic>
-      <p:pic>
-        <p:nvPicPr>
-          <p:cNvPr id="8" name="Picture 7"/>
-          <p:cNvPicPr>
-            <a:picLocks noChangeAspect="1"/>
-          </p:cNvPicPr>
-          <p:nvPr/>
-        </p:nvPicPr>
-        <p:blipFill>
-          <a:blip r:embed="rId9" cstate="print">
-            <a:extLst>
-              <a:ext uri="{28A0092B-C50C-407E-A947-70E740481C1C}">
-                <a14:useLocalDpi xmlns:a14="http://schemas.microsoft.com/office/drawing/2010/main" val="0"/>
-              </a:ext>
-            </a:extLst>
-          </a:blip>
-          <a:stretch>
-            <a:fillRect/>
-          </a:stretch>
-        </p:blipFill>
-        <p:spPr>
-          <a:xfrm>
-            <a:off x="11144090" y="117230"/>
-            <a:ext cx="977228" cy="301504"/>
-          </a:xfrm>
-          <a:prstGeom prst="rect">
-            <a:avLst/>
-          </a:prstGeom>
-        </p:spPr>
-      </p:pic>
-      <p:pic>
-        <p:nvPicPr>
-          <p:cNvPr id="9" name="Picture 8"/>
-          <p:cNvPicPr>
-            <a:picLocks noChangeAspect="1"/>
-          </p:cNvPicPr>
-          <p:nvPr/>
-        </p:nvPicPr>
-        <p:blipFill>
-          <a:blip r:embed="rId10" cstate="print">
-            <a:extLst>
-              <a:ext uri="{28A0092B-C50C-407E-A947-70E740481C1C}">
-                <a14:useLocalDpi xmlns:a14="http://schemas.microsoft.com/office/drawing/2010/main" val="0"/>
-              </a:ext>
-            </a:extLst>
-          </a:blip>
-          <a:stretch>
-            <a:fillRect/>
-          </a:stretch>
-        </p:blipFill>
-        <p:spPr>
-          <a:xfrm>
-            <a:off x="11144090" y="618026"/>
-            <a:ext cx="1018193" cy="500796"/>
-          </a:xfrm>
-          <a:prstGeom prst="rect">
-            <a:avLst/>
-          </a:prstGeom>
-        </p:spPr>
-      </p:pic>
-      <p:pic>
-        <p:nvPicPr>
-          <p:cNvPr id="10" name="Picture 9"/>
-          <p:cNvPicPr>
-            <a:picLocks noChangeAspect="1"/>
-          </p:cNvPicPr>
-          <p:nvPr/>
-        </p:nvPicPr>
-        <p:blipFill>
-          <a:blip r:embed="rId11" cstate="print">
-            <a:extLst>
-              <a:ext uri="{28A0092B-C50C-407E-A947-70E740481C1C}">
-                <a14:useLocalDpi xmlns:a14="http://schemas.microsoft.com/office/drawing/2010/main" val="0"/>
-              </a:ext>
-            </a:extLst>
-          </a:blip>
-          <a:stretch>
-            <a:fillRect/>
-          </a:stretch>
-        </p:blipFill>
-        <p:spPr>
-          <a:xfrm>
-            <a:off x="4822420" y="3264877"/>
-            <a:ext cx="1017271" cy="501719"/>
-          </a:xfrm>
-          <a:prstGeom prst="rect">
-            <a:avLst/>
-          </a:prstGeom>
-        </p:spPr>
-      </p:pic>
-      <p:pic>
-        <p:nvPicPr>
-          <p:cNvPr id="11" name="Picture 10"/>
-          <p:cNvPicPr>
-            <a:picLocks noChangeAspect="1"/>
-          </p:cNvPicPr>
-          <p:nvPr/>
-        </p:nvPicPr>
-        <p:blipFill>
-          <a:blip r:embed="rId12" cstate="print">
-            <a:extLst>
-              <a:ext uri="{28A0092B-C50C-407E-A947-70E740481C1C}">
-                <a14:useLocalDpi xmlns:a14="http://schemas.microsoft.com/office/drawing/2010/main" val="0"/>
-              </a:ext>
-            </a:extLst>
-          </a:blip>
-          <a:stretch>
-            <a:fillRect/>
-          </a:stretch>
-        </p:blipFill>
-        <p:spPr>
-          <a:xfrm>
-            <a:off x="11104020" y="3264876"/>
-            <a:ext cx="1017298" cy="501719"/>
-          </a:xfrm>
-          <a:prstGeom prst="rect">
-            <a:avLst/>
-          </a:prstGeom>
-        </p:spPr>
-      </p:pic>
-      <p:pic>
-        <p:nvPicPr>
-          <p:cNvPr id="12" name="Picture 11"/>
-          <p:cNvPicPr>
-            <a:picLocks noChangeAspect="1"/>
-          </p:cNvPicPr>
-          <p:nvPr/>
-        </p:nvPicPr>
-        <p:blipFill>
-          <a:blip r:embed="rId13" cstate="print">
-            <a:extLst>
-              <a:ext uri="{28A0092B-C50C-407E-A947-70E740481C1C}">
-                <a14:useLocalDpi xmlns:a14="http://schemas.microsoft.com/office/drawing/2010/main" val="0"/>
-              </a:ext>
-            </a:extLst>
-          </a:blip>
-          <a:stretch>
-            <a:fillRect/>
-          </a:stretch>
-        </p:blipFill>
-        <p:spPr>
-          <a:xfrm>
-            <a:off x="11102171" y="3964964"/>
-            <a:ext cx="1019147" cy="500796"/>
-          </a:xfrm>
-          <a:prstGeom prst="rect">
-            <a:avLst/>
-          </a:prstGeom>
-        </p:spPr>
-      </p:pic>
-      <p:pic>
-        <p:nvPicPr>
-          <p:cNvPr id="13" name="Picture 12"/>
-          <p:cNvPicPr>
-            <a:picLocks noChangeAspect="1"/>
-          </p:cNvPicPr>
-          <p:nvPr/>
-        </p:nvPicPr>
-        <p:blipFill>
-          <a:blip r:embed="rId14" cstate="print">
-            <a:extLst>
-              <a:ext uri="{28A0092B-C50C-407E-A947-70E740481C1C}">
-                <a14:useLocalDpi xmlns:a14="http://schemas.microsoft.com/office/drawing/2010/main" val="0"/>
-              </a:ext>
-            </a:extLst>
-          </a:blip>
-          <a:stretch>
-            <a:fillRect/>
-          </a:stretch>
-        </p:blipFill>
-        <p:spPr>
-          <a:xfrm>
-            <a:off x="11102171" y="4664129"/>
-            <a:ext cx="1017271" cy="501706"/>
-          </a:xfrm>
-          <a:prstGeom prst="rect">
-            <a:avLst/>
-          </a:prstGeom>
-        </p:spPr>
-      </p:pic>
-      <p:sp>
-        <p:nvSpPr>
-          <p:cNvPr id="14" name="TextBox 13"/>
-          <p:cNvSpPr txBox="1"/>
-          <p:nvPr/>
-        </p:nvSpPr>
-        <p:spPr>
-          <a:xfrm>
-            <a:off x="110833" y="2467652"/>
-            <a:ext cx="6178109" cy="461665"/>
-          </a:xfrm>
-          <a:prstGeom prst="rect">
-            <a:avLst/>
-          </a:prstGeom>
-          <a:noFill/>
-        </p:spPr>
-        <p:txBody>
-          <a:bodyPr wrap="square" rtlCol="0">
-            <a:spAutoFit/>
-          </a:bodyPr>
-          <a:lstStyle/>
-          <a:p>
-            <a:r>
-              <a:rPr lang="en-US" sz="1200" dirty="0" smtClean="0"/>
-              <a:t>Cluster 7 disease/function maps. Small maps represent “ophthalmic disease” and “organismal injury and abnormalities”, respectively</a:t>
-            </a:r>
-            <a:endParaRPr lang="en-US" sz="1200" dirty="0"/>
-          </a:p>
-        </p:txBody>
-      </p:sp>
-      <p:sp>
-        <p:nvSpPr>
-          <p:cNvPr id="15" name="TextBox 14"/>
-          <p:cNvSpPr txBox="1"/>
-          <p:nvPr/>
-        </p:nvSpPr>
-        <p:spPr>
-          <a:xfrm>
-            <a:off x="1599" y="5551977"/>
-            <a:ext cx="6178109" cy="461665"/>
-          </a:xfrm>
-          <a:prstGeom prst="rect">
-            <a:avLst/>
-          </a:prstGeom>
-          <a:noFill/>
-        </p:spPr>
-        <p:txBody>
-          <a:bodyPr wrap="square" rtlCol="0">
-            <a:spAutoFit/>
-          </a:bodyPr>
-          <a:lstStyle/>
-          <a:p>
-            <a:r>
-              <a:rPr lang="en-US" sz="1200" dirty="0" smtClean="0"/>
-              <a:t>Cluster 20 disease/function map. Small map represents “small molecule biochemistry”, and the significant square represents “Metabolism of D-galactose”.</a:t>
-            </a:r>
-            <a:endParaRPr lang="en-US" sz="1200" dirty="0"/>
-          </a:p>
-        </p:txBody>
-      </p:sp>
-      <p:sp>
-        <p:nvSpPr>
-          <p:cNvPr id="16" name="TextBox 15"/>
-          <p:cNvSpPr txBox="1"/>
-          <p:nvPr/>
-        </p:nvSpPr>
-        <p:spPr>
-          <a:xfrm>
-            <a:off x="6375685" y="2471281"/>
-            <a:ext cx="5743757" cy="461665"/>
-          </a:xfrm>
-          <a:prstGeom prst="rect">
-            <a:avLst/>
-          </a:prstGeom>
-          <a:noFill/>
-        </p:spPr>
-        <p:txBody>
-          <a:bodyPr wrap="square" rtlCol="0">
-            <a:spAutoFit/>
-          </a:bodyPr>
-          <a:lstStyle/>
-          <a:p>
-            <a:r>
-              <a:rPr lang="en-US" sz="1200" dirty="0" smtClean="0"/>
-              <a:t>Cluster 8 disease/function maps. Small maps represent “ophthalmic disease” and “organismal injury and abnormalities”, respectively</a:t>
-            </a:r>
-            <a:endParaRPr lang="en-US" sz="1200" dirty="0"/>
-          </a:p>
-        </p:txBody>
-      </p:sp>
-      <p:sp>
-        <p:nvSpPr>
-          <p:cNvPr id="17" name="TextBox 16"/>
-          <p:cNvSpPr txBox="1"/>
-          <p:nvPr/>
-        </p:nvSpPr>
-        <p:spPr>
-          <a:xfrm>
-            <a:off x="6288942" y="5551976"/>
-            <a:ext cx="5743757" cy="461665"/>
-          </a:xfrm>
-          <a:prstGeom prst="rect">
-            <a:avLst/>
-          </a:prstGeom>
-          <a:noFill/>
-        </p:spPr>
-        <p:txBody>
-          <a:bodyPr wrap="square" rtlCol="0">
-            <a:spAutoFit/>
-          </a:bodyPr>
-          <a:lstStyle/>
-          <a:p>
-            <a:r>
-              <a:rPr lang="en-US" sz="1200" dirty="0" smtClean="0"/>
-              <a:t>Cluster 21 disease/function maps. Small maps represent “ophthalmic disease”, “organismal injury and abnormalities”, and “cellular migration”, respectively</a:t>
-            </a:r>
-            <a:endParaRPr lang="en-US" sz="1200" dirty="0"/>
-          </a:p>
-        </p:txBody>
-      </p:sp>
     </p:spTree>
     <p:extLst>
       <p:ext uri="{BB962C8B-B14F-4D97-AF65-F5344CB8AC3E}">
@@ -7449,7 +8371,35 @@
             </a:r>
             <a:r>
               <a:rPr lang="en-US" dirty="0" smtClean="0"/>
-              <a:t>, are still not fully elucidated. We collected cataract-related genes and interactions from online databases and mapped these interactions in </a:t>
+              <a:t>, are still not fully elucidated. We collected cataract-related genes </a:t>
+            </a:r>
+            <a:r>
+              <a:rPr lang="en-US" dirty="0" smtClean="0"/>
+              <a:t>from PubMed and </a:t>
+            </a:r>
+            <a:r>
+              <a:rPr lang="en-US" dirty="0" err="1" smtClean="0"/>
+              <a:t>Phenopedia</a:t>
+            </a:r>
+            <a:r>
+              <a:rPr lang="en-US" dirty="0" smtClean="0"/>
+              <a:t>, found interactions </a:t>
+            </a:r>
+            <a:r>
+              <a:rPr lang="en-US" dirty="0" smtClean="0"/>
+              <a:t>from </a:t>
+            </a:r>
+            <a:r>
+              <a:rPr lang="en-US" dirty="0" err="1" smtClean="0"/>
+              <a:t>GeneFriends</a:t>
+            </a:r>
+            <a:r>
+              <a:rPr lang="en-US" dirty="0" smtClean="0"/>
+              <a:t>, </a:t>
+            </a:r>
+            <a:r>
+              <a:rPr lang="en-US" dirty="0" smtClean="0"/>
+              <a:t>and mapped these interactions in </a:t>
             </a:r>
             <a:r>
               <a:rPr lang="en-US" dirty="0" err="1" smtClean="0"/>
@@ -7457,7 +8407,31 @@
             </a:r>
             <a:r>
               <a:rPr lang="en-US" dirty="0" smtClean="0"/>
-              <a:t>. Then, we clustered the networks and analyzed the clusters in various tools, including functional analysis in IPA. This functional analysis yielded two previously unassociated factors that may play a role in the etiology of cataract.</a:t>
+              <a:t>. Then, we clustered the networks and analyzed the clusters in various </a:t>
+            </a:r>
+            <a:r>
+              <a:rPr lang="en-US" dirty="0" smtClean="0"/>
+              <a:t>tools (</a:t>
+            </a:r>
+            <a:r>
+              <a:rPr lang="en-US" dirty="0" err="1" smtClean="0"/>
+              <a:t>BinGO</a:t>
+            </a:r>
+            <a:r>
+              <a:rPr lang="en-US" dirty="0" smtClean="0"/>
+              <a:t>, </a:t>
+            </a:r>
+            <a:r>
+              <a:rPr lang="en-US" dirty="0" err="1" smtClean="0"/>
+              <a:t>GeneOntology</a:t>
+            </a:r>
+            <a:r>
+              <a:rPr lang="en-US" dirty="0" smtClean="0"/>
+              <a:t>, DAVID, IPA), </a:t>
+            </a:r>
+            <a:r>
+              <a:rPr lang="en-US" dirty="0" smtClean="0"/>
+              <a:t>including functional analysis in IPA. This functional analysis yielded two previously unassociated factors that may play a role in the etiology of cataract.</a:t>
             </a:r>
             <a:endParaRPr lang="en-US" dirty="0"/>
           </a:p>
@@ -7537,7 +8511,7 @@
         <p:spPr/>
         <p:txBody>
           <a:bodyPr>
-            <a:normAutofit fontScale="70000" lnSpcReduction="20000"/>
+            <a:normAutofit fontScale="55000" lnSpcReduction="20000"/>
           </a:bodyPr>
           <a:lstStyle/>
           <a:p>
@@ -7742,36 +8716,16 @@
               <a:buNone/>
             </a:pPr>
             <a:r>
-              <a:rPr lang="en-US" dirty="0" err="1" smtClean="0"/>
-              <a:t>Maere</a:t>
-            </a:r>
-            <a:r>
-              <a:rPr lang="en-US" dirty="0"/>
-              <a:t>, Steven, et al. “</a:t>
-            </a:r>
-            <a:r>
-              <a:rPr lang="en-US" dirty="0" err="1"/>
-              <a:t>BiNGO</a:t>
-            </a:r>
-            <a:r>
-              <a:rPr lang="en-US" dirty="0"/>
-              <a:t>: a </a:t>
-            </a:r>
-            <a:r>
-              <a:rPr lang="en-US" dirty="0" err="1"/>
-              <a:t>Cytoscape</a:t>
-            </a:r>
-            <a:r>
-              <a:rPr lang="en-US" dirty="0"/>
-              <a:t> Plugin to Assess Overrepresentation of Gene Ontology Categories in Biological Networks.” </a:t>
+              <a:rPr lang="en-US" dirty="0"/>
+              <a:t>Lee, Alan Y. W., and Stephen S. M. Chung. “Contributions of Polyol Pathway to Oxidative Stress in Diabetic Cataract.” </a:t>
             </a:r>
             <a:r>
               <a:rPr lang="en-US" i="1" dirty="0"/>
-              <a:t>Bioinformatics</a:t>
-            </a:r>
-            <a:r>
-              <a:rPr lang="en-US" dirty="0"/>
-              <a:t>, vol. 21, no. 16, 21 Mar. 2005, pp. 3448–3449., doi:10.1093/bioinformatics/bti551.</a:t>
+              <a:t>The FASEB Journal</a:t>
+            </a:r>
+            <a:r>
+              <a:rPr lang="en-US" dirty="0"/>
+              <a:t>, vol. 13, no. 1, Jan. 1999, pp. 23–30., doi:10.1096/fasebj.13.1.23.</a:t>
             </a:r>
           </a:p>
           <a:p>
@@ -7780,27 +8734,35 @@
             </a:pPr>
             <a:r>
               <a:rPr lang="en-US" dirty="0" err="1" smtClean="0"/>
-              <a:t>Nepusz</a:t>
-            </a:r>
-            <a:r>
-              <a:rPr lang="en-US" dirty="0"/>
-              <a:t>, </a:t>
+              <a:t>Maere</a:t>
+            </a:r>
+            <a:r>
+              <a:rPr lang="en-US" dirty="0"/>
+              <a:t>, Steven, et al. “</a:t>
             </a:r>
             <a:r>
               <a:rPr lang="en-US" dirty="0" err="1"/>
-              <a:t>Tamás</a:t>
-            </a:r>
-            <a:r>
-              <a:rPr lang="en-US" dirty="0"/>
-              <a:t>, et al. “Detecting Overlapping Protein Complexes in Protein-Protein Interaction Networks.” </a:t>
+              <a:t>BiNGO</a:t>
+            </a:r>
+            <a:r>
+              <a:rPr lang="en-US" dirty="0"/>
+              <a:t>: a </a:t>
+            </a:r>
+            <a:r>
+              <a:rPr lang="en-US" dirty="0" err="1"/>
+              <a:t>Cytoscape</a:t>
+            </a:r>
+            <a:r>
+              <a:rPr lang="en-US" dirty="0"/>
+              <a:t> Plugin to Assess Overrepresentation of Gene Ontology Categories in Biological Networks.” </a:t>
             </a:r>
             <a:r>
               <a:rPr lang="en-US" i="1" dirty="0"/>
-              <a:t>Nature Methods</a:t>
-            </a:r>
-            <a:r>
-              <a:rPr lang="en-US" dirty="0"/>
-              <a:t>, vol. 9, no. 5, 18 Mar. 2012, pp. 471–472., doi:10.1038/nmeth.1938.</a:t>
+              <a:t>Bioinformatics</a:t>
+            </a:r>
+            <a:r>
+              <a:rPr lang="en-US" dirty="0"/>
+              <a:t>, vol. 21, no. 16, 21 Mar. 2005, pp. 3448–3449., doi:10.1093/bioinformatics/bti551.</a:t>
             </a:r>
           </a:p>
           <a:p>
@@ -7808,36 +8770,28 @@
               <a:buNone/>
             </a:pPr>
             <a:r>
-              <a:rPr lang="en-US" dirty="0" smtClean="0"/>
-              <a:t>Shannon</a:t>
-            </a:r>
-            <a:r>
-              <a:rPr lang="en-US" dirty="0"/>
-              <a:t>, Paul, et al. “</a:t>
+              <a:rPr lang="en-US" dirty="0" err="1" smtClean="0"/>
+              <a:t>Nepusz</a:t>
+            </a:r>
+            <a:r>
+              <a:rPr lang="en-US" dirty="0"/>
+              <a:t>, </a:t>
             </a:r>
             <a:r>
               <a:rPr lang="en-US" dirty="0" err="1"/>
-              <a:t>Cytoscape</a:t>
-            </a:r>
-            <a:r>
-              <a:rPr lang="en-US" dirty="0"/>
-              <a:t>: A Software Environment for Integrated Models of </a:t>
-            </a:r>
-            <a:r>
-              <a:rPr lang="en-US" dirty="0" err="1"/>
-              <a:t>Biomolecular</a:t>
-            </a:r>
-            <a:r>
-              <a:rPr lang="en-US" dirty="0"/>
-              <a:t> Interaction Networks.” </a:t>
+              <a:t>Tamás</a:t>
+            </a:r>
+            <a:r>
+              <a:rPr lang="en-US" dirty="0"/>
+              <a:t>, et al. “Detecting Overlapping Protein Complexes in Protein-Protein Interaction Networks.” </a:t>
             </a:r>
             <a:r>
               <a:rPr lang="en-US" i="1" dirty="0"/>
-              <a:t>Genome Research</a:t>
-            </a:r>
-            <a:r>
-              <a:rPr lang="en-US" dirty="0"/>
-              <a:t>, vol. 13, no. 11, 1 Nov. 2003, pp. 2498–2504., doi:10.1101/gr.1239303.</a:t>
+              <a:t>Nature Methods</a:t>
+            </a:r>
+            <a:r>
+              <a:rPr lang="en-US" dirty="0"/>
+              <a:t>, vol. 9, no. 5, 18 Mar. 2012, pp. 471–472., doi:10.1038/nmeth.1938.</a:t>
             </a:r>
           </a:p>
           <a:p>
@@ -7846,35 +8800,35 @@
             </a:pPr>
             <a:r>
               <a:rPr lang="en-US" dirty="0" smtClean="0"/>
-              <a:t>The Gene Ontology Consortium. “The </a:t>
-            </a:r>
-            <a:r>
-              <a:rPr lang="en-US" dirty="0"/>
-              <a:t>Gene Ontology Resource: 20 Years and Still </a:t>
+              <a:t>Shannon</a:t>
+            </a:r>
+            <a:r>
+              <a:rPr lang="en-US" dirty="0"/>
+              <a:t>, Paul, et al. “</a:t>
             </a:r>
             <a:r>
               <a:rPr lang="en-US" dirty="0" err="1"/>
-              <a:t>GOing</a:t>
-            </a:r>
-            <a:r>
-              <a:rPr lang="en-US" dirty="0"/>
-              <a:t> Strong.” </a:t>
+              <a:t>Cytoscape</a:t>
+            </a:r>
+            <a:r>
+              <a:rPr lang="en-US" dirty="0"/>
+              <a:t>: A Software Environment for Integrated Models of </a:t>
+            </a:r>
+            <a:r>
+              <a:rPr lang="en-US" dirty="0" err="1"/>
+              <a:t>Biomolecular</a:t>
+            </a:r>
+            <a:r>
+              <a:rPr lang="en-US" dirty="0"/>
+              <a:t> Interaction Networks.” </a:t>
             </a:r>
             <a:r>
               <a:rPr lang="en-US" i="1" dirty="0"/>
-              <a:t>Nucleic Acids Research</a:t>
-            </a:r>
-            <a:r>
-              <a:rPr lang="en-US" dirty="0"/>
-              <a:t>, vol. 47, no. D1, 8 Jan. 2018, pp. D330–D338., doi:10.1093/</a:t>
-            </a:r>
-            <a:r>
-              <a:rPr lang="en-US" dirty="0" err="1"/>
-              <a:t>nar</a:t>
-            </a:r>
-            <a:r>
-              <a:rPr lang="en-US" dirty="0"/>
-              <a:t>/gky1055.</a:t>
+              <a:t>Genome Research</a:t>
+            </a:r>
+            <a:r>
+              <a:rPr lang="en-US" dirty="0"/>
+              <a:t>, vol. 13, no. 11, 1 Nov. 2003, pp. 2498–2504., doi:10.1101/gr.1239303.</a:t>
             </a:r>
           </a:p>
           <a:p>
@@ -7883,6 +8837,43 @@
             </a:pPr>
             <a:r>
               <a:rPr lang="en-US" dirty="0" smtClean="0"/>
+              <a:t>The Gene Ontology Consortium. “The </a:t>
+            </a:r>
+            <a:r>
+              <a:rPr lang="en-US" dirty="0"/>
+              <a:t>Gene Ontology Resource: 20 Years and Still </a:t>
+            </a:r>
+            <a:r>
+              <a:rPr lang="en-US" dirty="0" err="1"/>
+              <a:t>GOing</a:t>
+            </a:r>
+            <a:r>
+              <a:rPr lang="en-US" dirty="0"/>
+              <a:t> Strong.” </a:t>
+            </a:r>
+            <a:r>
+              <a:rPr lang="en-US" i="1" dirty="0"/>
+              <a:t>Nucleic Acids Research</a:t>
+            </a:r>
+            <a:r>
+              <a:rPr lang="en-US" dirty="0"/>
+              <a:t>, vol. 47, no. D1, 8 Jan. 2018, pp. D330–D338., doi:10.1093/</a:t>
+            </a:r>
+            <a:r>
+              <a:rPr lang="en-US" dirty="0" err="1"/>
+              <a:t>nar</a:t>
+            </a:r>
+            <a:r>
+              <a:rPr lang="en-US" dirty="0"/>
+              <a:t>/gky1055.</a:t>
+            </a:r>
+          </a:p>
+          <a:p>
+            <a:pPr marL="574675" indent="-457200">
+              <a:buNone/>
+            </a:pPr>
+            <a:r>
+              <a:rPr lang="en-US" dirty="0" smtClean="0"/>
               <a:t>Truscott</a:t>
             </a:r>
             <a:r>
@@ -7906,6 +8897,27 @@
               <a:t> </a:t>
             </a:r>
             <a:endParaRPr lang="en-US" dirty="0" smtClean="0"/>
+          </a:p>
+          <a:p>
+            <a:pPr marL="574675" indent="-457200">
+              <a:buNone/>
+            </a:pPr>
+            <a:r>
+              <a:rPr lang="en-US" dirty="0" err="1"/>
+              <a:t>Wajant</a:t>
+            </a:r>
+            <a:r>
+              <a:rPr lang="en-US" dirty="0"/>
+              <a:t>, H, et al. “Tumor Necrosis Factor Signaling.” </a:t>
+            </a:r>
+            <a:r>
+              <a:rPr lang="en-US" i="1" dirty="0"/>
+              <a:t>Cell Death &amp; Differentiation</a:t>
+            </a:r>
+            <a:r>
+              <a:rPr lang="en-US" dirty="0"/>
+              <a:t>, vol. 10, no. 1, 2003, pp. 45–65., doi:10.1038/sj.cdd.4401189.</a:t>
+            </a:r>
           </a:p>
           <a:p>
             <a:pPr marL="574675" indent="-457200">
@@ -9703,6 +10715,92 @@
           </a:p>
         </p:txBody>
       </p:sp>
+      <p:sp>
+        <p:nvSpPr>
+          <p:cNvPr id="3" name="TextBox 2"/>
+          <p:cNvSpPr txBox="1"/>
+          <p:nvPr/>
+        </p:nvSpPr>
+        <p:spPr>
+          <a:xfrm>
+            <a:off x="2971800" y="5695950"/>
+            <a:ext cx="9077325" cy="923330"/>
+          </a:xfrm>
+          <a:prstGeom prst="rect">
+            <a:avLst/>
+          </a:prstGeom>
+          <a:noFill/>
+        </p:spPr>
+        <p:txBody>
+          <a:bodyPr wrap="square" rtlCol="0">
+            <a:spAutoFit/>
+          </a:bodyPr>
+          <a:lstStyle/>
+          <a:p>
+            <a:r>
+              <a:rPr lang="en-US" dirty="0" smtClean="0">
+                <a:solidFill>
+                  <a:schemeClr val="bg1"/>
+                </a:solidFill>
+              </a:rPr>
+              <a:t>Clusters extracted from </a:t>
+            </a:r>
+            <a:r>
+              <a:rPr lang="en-US" dirty="0" err="1" smtClean="0">
+                <a:solidFill>
+                  <a:schemeClr val="bg1"/>
+                </a:solidFill>
+              </a:rPr>
+              <a:t>Cytoscape</a:t>
+            </a:r>
+            <a:r>
+              <a:rPr lang="en-US" dirty="0" smtClean="0">
+                <a:solidFill>
+                  <a:schemeClr val="bg1"/>
+                </a:solidFill>
+              </a:rPr>
+              <a:t> via </a:t>
+            </a:r>
+            <a:r>
+              <a:rPr lang="en-US" dirty="0" err="1" smtClean="0">
+                <a:solidFill>
+                  <a:schemeClr val="bg1"/>
+                </a:solidFill>
+              </a:rPr>
+              <a:t>ClusterONE</a:t>
+            </a:r>
+            <a:r>
+              <a:rPr lang="en-US" dirty="0" smtClean="0">
+                <a:solidFill>
+                  <a:schemeClr val="bg1"/>
+                </a:solidFill>
+              </a:rPr>
+              <a:t> were processed with </a:t>
+            </a:r>
+            <a:r>
+              <a:rPr lang="en-US" dirty="0" err="1" smtClean="0">
+                <a:solidFill>
+                  <a:schemeClr val="bg1"/>
+                </a:solidFill>
+              </a:rPr>
+              <a:t>GeneOntology</a:t>
+            </a:r>
+            <a:r>
+              <a:rPr lang="en-US" dirty="0" smtClean="0">
+                <a:solidFill>
+                  <a:schemeClr val="bg1"/>
+                </a:solidFill>
+              </a:rPr>
+              <a:t>, and sorted by alphabetical order. The above clusters with significant p-values (p&lt;0.05) were then processed in IPA to search for common functions.</a:t>
+            </a:r>
+            <a:endParaRPr lang="en-US" dirty="0">
+              <a:solidFill>
+                <a:schemeClr val="bg1"/>
+              </a:solidFill>
+            </a:endParaRPr>
+          </a:p>
+        </p:txBody>
+      </p:sp>
     </p:spTree>
     <p:extLst>
       <p:ext uri="{BB962C8B-B14F-4D97-AF65-F5344CB8AC3E}">
@@ -9797,8 +10895,8 @@
           </a:p>
           <a:p>
             <a:r>
-              <a:rPr lang="en-US" dirty="0"/>
-              <a:t>A standard cataract-related </a:t>
+              <a:rPr lang="en-US" dirty="0" smtClean="0"/>
+              <a:t>Network 1 based on cluster 7 is a cataract-related </a:t>
             </a:r>
             <a:r>
               <a:rPr lang="en-US" dirty="0" smtClean="0"/>

</xml_diff>